<commit_message>
Wer vo eich hod mein Scheiß naum foisch gschriem?!
</commit_message>
<xml_diff>
--- a/Dokumentation/Präsentation.pptx
+++ b/Dokumentation/Präsentation.pptx
@@ -3799,7 +3799,7 @@
           <a:p>
             <a:fld id="{5CB0383F-276E-594D-B692-B1F3CB76A8CF}" type="datetimeFigureOut">
               <a:rPr lang="de-AT" smtClean="0"/>
-              <a:t>29.01.2024</a:t>
+              <a:t>01.02.2024</a:t>
             </a:fld>
             <a:endParaRPr lang="de-AT"/>
           </a:p>
@@ -4288,7 +4288,7 @@
           <a:p>
             <a:fld id="{DE54C2E3-43D0-0F4B-95D2-FADEC5486F79}" type="datetimeFigureOut">
               <a:rPr lang="de-AT" smtClean="0"/>
-              <a:t>29.01.2024</a:t>
+              <a:t>01.02.2024</a:t>
             </a:fld>
             <a:endParaRPr lang="de-AT"/>
           </a:p>
@@ -4458,7 +4458,7 @@
           <a:p>
             <a:fld id="{DE54C2E3-43D0-0F4B-95D2-FADEC5486F79}" type="datetimeFigureOut">
               <a:rPr lang="de-AT" smtClean="0"/>
-              <a:t>29.01.2024</a:t>
+              <a:t>01.02.2024</a:t>
             </a:fld>
             <a:endParaRPr lang="de-AT"/>
           </a:p>
@@ -4638,7 +4638,7 @@
           <a:p>
             <a:fld id="{DE54C2E3-43D0-0F4B-95D2-FADEC5486F79}" type="datetimeFigureOut">
               <a:rPr lang="de-AT" smtClean="0"/>
-              <a:t>29.01.2024</a:t>
+              <a:t>01.02.2024</a:t>
             </a:fld>
             <a:endParaRPr lang="de-AT"/>
           </a:p>
@@ -4846,7 +4846,7 @@
           <a:p>
             <a:fld id="{DE54C2E3-43D0-0F4B-95D2-FADEC5486F79}" type="datetimeFigureOut">
               <a:rPr lang="de-AT" smtClean="0"/>
-              <a:t>29.01.2024</a:t>
+              <a:t>01.02.2024</a:t>
             </a:fld>
             <a:endParaRPr lang="de-AT"/>
           </a:p>
@@ -5092,7 +5092,7 @@
           <a:p>
             <a:fld id="{DE54C2E3-43D0-0F4B-95D2-FADEC5486F79}" type="datetimeFigureOut">
               <a:rPr lang="de-AT" smtClean="0"/>
-              <a:t>29.01.2024</a:t>
+              <a:t>01.02.2024</a:t>
             </a:fld>
             <a:endParaRPr lang="de-AT"/>
           </a:p>
@@ -5324,7 +5324,7 @@
           <a:p>
             <a:fld id="{DE54C2E3-43D0-0F4B-95D2-FADEC5486F79}" type="datetimeFigureOut">
               <a:rPr lang="de-AT" smtClean="0"/>
-              <a:t>29.01.2024</a:t>
+              <a:t>01.02.2024</a:t>
             </a:fld>
             <a:endParaRPr lang="de-AT"/>
           </a:p>
@@ -5691,7 +5691,7 @@
           <a:p>
             <a:fld id="{DE54C2E3-43D0-0F4B-95D2-FADEC5486F79}" type="datetimeFigureOut">
               <a:rPr lang="de-AT" smtClean="0"/>
-              <a:t>29.01.2024</a:t>
+              <a:t>01.02.2024</a:t>
             </a:fld>
             <a:endParaRPr lang="de-AT"/>
           </a:p>
@@ -5809,7 +5809,7 @@
           <a:p>
             <a:fld id="{DE54C2E3-43D0-0F4B-95D2-FADEC5486F79}" type="datetimeFigureOut">
               <a:rPr lang="de-AT" smtClean="0"/>
-              <a:t>29.01.2024</a:t>
+              <a:t>01.02.2024</a:t>
             </a:fld>
             <a:endParaRPr lang="de-AT"/>
           </a:p>
@@ -5904,7 +5904,7 @@
           <a:p>
             <a:fld id="{DE54C2E3-43D0-0F4B-95D2-FADEC5486F79}" type="datetimeFigureOut">
               <a:rPr lang="de-AT" smtClean="0"/>
-              <a:t>29.01.2024</a:t>
+              <a:t>01.02.2024</a:t>
             </a:fld>
             <a:endParaRPr lang="de-AT"/>
           </a:p>
@@ -6181,7 +6181,7 @@
           <a:p>
             <a:fld id="{DE54C2E3-43D0-0F4B-95D2-FADEC5486F79}" type="datetimeFigureOut">
               <a:rPr lang="de-AT" smtClean="0"/>
-              <a:t>29.01.2024</a:t>
+              <a:t>01.02.2024</a:t>
             </a:fld>
             <a:endParaRPr lang="de-AT"/>
           </a:p>
@@ -6438,7 +6438,7 @@
           <a:p>
             <a:fld id="{DE54C2E3-43D0-0F4B-95D2-FADEC5486F79}" type="datetimeFigureOut">
               <a:rPr lang="de-AT" smtClean="0"/>
-              <a:t>29.01.2024</a:t>
+              <a:t>01.02.2024</a:t>
             </a:fld>
             <a:endParaRPr lang="de-AT"/>
           </a:p>
@@ -6651,7 +6651,7 @@
           <a:p>
             <a:fld id="{DE54C2E3-43D0-0F4B-95D2-FADEC5486F79}" type="datetimeFigureOut">
               <a:rPr lang="de-AT" smtClean="0"/>
-              <a:t>29.01.2024</a:t>
+              <a:t>01.02.2024</a:t>
             </a:fld>
             <a:endParaRPr lang="de-AT"/>
           </a:p>
@@ -7660,15 +7660,7 @@
             <a:pPr algn="l"/>
             <a:r>
               <a:rPr lang="de-AT" dirty="0"/>
-              <a:t>Hahn Alexander, Klement Tobias, </a:t>
-            </a:r>
-            <a:r>
-              <a:rPr lang="de-AT" dirty="0" err="1"/>
-              <a:t>Pfarrhofer</a:t>
-            </a:r>
-            <a:r>
-              <a:rPr lang="de-AT" dirty="0"/>
-              <a:t> Phillip, Reisinger Raphael</a:t>
+              <a:t>Hahn Alexander, Klement Tobias, Pfarrhofer Philip, Reisinger Raphael</a:t>
             </a:r>
           </a:p>
         </p:txBody>

</xml_diff>